<commit_message>
global reorganisation + app concept renaming
</commit_message>
<xml_diff>
--- a/images/cover.pptx
+++ b/images/cover.pptx
@@ -110,6 +110,36 @@
       </a:defRPr>
     </a:lvl9pPr>
   </p:defaultTextStyle>
+  <p:extLst>
+    <p:ext uri="{EFAFB233-063F-42B5-8137-9DF3F51BA10A}">
+      <p15:sldGuideLst xmlns:p15="http://schemas.microsoft.com/office/powerpoint/2012/main">
+        <p15:guide id="1" orient="horz" pos="3120">
+          <p15:clr>
+            <a:srgbClr val="A4A3A4"/>
+          </p15:clr>
+        </p15:guide>
+        <p15:guide id="2" pos="2160">
+          <p15:clr>
+            <a:srgbClr val="A4A3A4"/>
+          </p15:clr>
+        </p15:guide>
+      </p15:sldGuideLst>
+    </p:ext>
+    <p:ext uri="{2D200454-40CA-4A62-9FC3-DE9A4176ACB9}">
+      <p15:notesGuideLst xmlns:p15="http://schemas.microsoft.com/office/powerpoint/2012/main">
+        <p15:guide id="1" orient="horz" pos="2880">
+          <p15:clr>
+            <a:srgbClr val="A4A3A4"/>
+          </p15:clr>
+        </p15:guide>
+        <p15:guide id="2" pos="2160">
+          <p15:clr>
+            <a:srgbClr val="A4A3A4"/>
+          </p15:clr>
+        </p15:guide>
+      </p15:notesGuideLst>
+    </p:ext>
+  </p:extLst>
 </p:presentation>
 </file>
 
@@ -195,7 +225,7 @@
           <a:p>
             <a:fld id="{5881D6F3-2C26-4BCB-BAFA-B567AFA11E00}" type="datetimeFigureOut">
               <a:rPr lang="nl-NL" smtClean="0"/>
-              <a:t>27-5-2020</a:t>
+              <a:t>7-4-2022</a:t>
             </a:fld>
             <a:endParaRPr lang="nl-NL"/>
           </a:p>
@@ -360,7 +390,7 @@
           <a:p>
             <a:fld id="{BD9C3D34-49B2-44B9-8711-4DD48E4545A5}" type="datetimeFigureOut">
               <a:rPr lang="en-US" smtClean="0"/>
-              <a:t>5/27/2020</a:t>
+              <a:t>4/7/2022</a:t>
             </a:fld>
             <a:endParaRPr lang="en-US"/>
           </a:p>
@@ -424,38 +454,37 @@
           <a:p>
             <a:pPr lvl="0"/>
             <a:r>
-              <a:rPr lang="en-US" smtClean="0"/>
+              <a:rPr lang="en-US"/>
               <a:t>Click to edit Master text styles</a:t>
             </a:r>
           </a:p>
           <a:p>
             <a:pPr lvl="1"/>
             <a:r>
-              <a:rPr lang="en-US" smtClean="0"/>
+              <a:rPr lang="en-US"/>
               <a:t>Second level</a:t>
             </a:r>
           </a:p>
           <a:p>
             <a:pPr lvl="2"/>
             <a:r>
-              <a:rPr lang="en-US" smtClean="0"/>
+              <a:rPr lang="en-US"/>
               <a:t>Third level</a:t>
             </a:r>
           </a:p>
           <a:p>
             <a:pPr lvl="3"/>
             <a:r>
-              <a:rPr lang="en-US" smtClean="0"/>
+              <a:rPr lang="en-US"/>
               <a:t>Fourth level</a:t>
             </a:r>
           </a:p>
           <a:p>
             <a:pPr lvl="4"/>
             <a:r>
-              <a:rPr lang="en-US" smtClean="0"/>
+              <a:rPr lang="en-US"/>
               <a:t>Fifth level</a:t>
             </a:r>
-            <a:endParaRPr lang="en-US"/>
           </a:p>
         </p:txBody>
       </p:sp>
@@ -750,7 +779,7 @@
           <a:lstStyle/>
           <a:p>
             <a:r>
-              <a:rPr lang="en-US" smtClean="0"/>
+              <a:rPr lang="en-US"/>
               <a:t>Click to edit Master title style</a:t>
             </a:r>
             <a:endParaRPr lang="nl-NL"/>
@@ -869,7 +898,7 @@
           </a:lstStyle>
           <a:p>
             <a:r>
-              <a:rPr lang="en-US" smtClean="0"/>
+              <a:rPr lang="en-US"/>
               <a:t>Click to edit Master subtitle style</a:t>
             </a:r>
             <a:endParaRPr lang="nl-NL"/>
@@ -893,7 +922,7 @@
           <a:p>
             <a:fld id="{F0F8CB53-170E-49FC-B857-E4F107597979}" type="datetime1">
               <a:rPr lang="nl-NL" smtClean="0"/>
-              <a:t>27-5-2020</a:t>
+              <a:t>7-4-2022</a:t>
             </a:fld>
             <a:endParaRPr lang="nl-NL"/>
           </a:p>
@@ -951,13 +980,6 @@
   <p:clrMapOvr>
     <a:masterClrMapping/>
   </p:clrMapOvr>
-  <p:timing>
-    <p:tnLst>
-      <p:par>
-        <p:cTn id="1" dur="indefinite" restart="never" nodeType="tmRoot"/>
-      </p:par>
-    </p:tnLst>
-  </p:timing>
 </p:sldLayout>
 </file>
 
@@ -994,7 +1016,7 @@
           <a:lstStyle/>
           <a:p>
             <a:r>
-              <a:rPr lang="en-US" smtClean="0"/>
+              <a:rPr lang="en-US"/>
               <a:t>Click to edit Master title style</a:t>
             </a:r>
             <a:endParaRPr lang="nl-NL"/>
@@ -1018,35 +1040,35 @@
           <a:p>
             <a:pPr lvl="0"/>
             <a:r>
-              <a:rPr lang="en-US" smtClean="0"/>
+              <a:rPr lang="en-US"/>
               <a:t>Click to edit Master text styles</a:t>
             </a:r>
           </a:p>
           <a:p>
             <a:pPr lvl="1"/>
             <a:r>
-              <a:rPr lang="en-US" smtClean="0"/>
+              <a:rPr lang="en-US"/>
               <a:t>Second level</a:t>
             </a:r>
           </a:p>
           <a:p>
             <a:pPr lvl="2"/>
             <a:r>
-              <a:rPr lang="en-US" smtClean="0"/>
+              <a:rPr lang="en-US"/>
               <a:t>Third level</a:t>
             </a:r>
           </a:p>
           <a:p>
             <a:pPr lvl="3"/>
             <a:r>
-              <a:rPr lang="en-US" smtClean="0"/>
+              <a:rPr lang="en-US"/>
               <a:t>Fourth level</a:t>
             </a:r>
           </a:p>
           <a:p>
             <a:pPr lvl="4"/>
             <a:r>
-              <a:rPr lang="en-US" smtClean="0"/>
+              <a:rPr lang="en-US"/>
               <a:t>Fifth level</a:t>
             </a:r>
             <a:endParaRPr lang="nl-NL"/>
@@ -1070,7 +1092,7 @@
           <a:p>
             <a:fld id="{2B619E2E-871C-4FB7-8FE1-016809CD5716}" type="datetime1">
               <a:rPr lang="nl-NL" smtClean="0"/>
-              <a:t>27-5-2020</a:t>
+              <a:t>7-4-2022</a:t>
             </a:fld>
             <a:endParaRPr lang="nl-NL"/>
           </a:p>
@@ -1128,13 +1150,6 @@
   <p:clrMapOvr>
     <a:masterClrMapping/>
   </p:clrMapOvr>
-  <p:timing>
-    <p:tnLst>
-      <p:par>
-        <p:cTn id="1" dur="indefinite" restart="never" nodeType="tmRoot"/>
-      </p:par>
-    </p:tnLst>
-  </p:timing>
 </p:sldLayout>
 </file>
 
@@ -1176,7 +1191,7 @@
           <a:lstStyle/>
           <a:p>
             <a:r>
-              <a:rPr lang="en-US" smtClean="0"/>
+              <a:rPr lang="en-US"/>
               <a:t>Click to edit Master title style</a:t>
             </a:r>
             <a:endParaRPr lang="nl-NL"/>
@@ -1205,35 +1220,35 @@
           <a:p>
             <a:pPr lvl="0"/>
             <a:r>
-              <a:rPr lang="en-US" smtClean="0"/>
+              <a:rPr lang="en-US"/>
               <a:t>Click to edit Master text styles</a:t>
             </a:r>
           </a:p>
           <a:p>
             <a:pPr lvl="1"/>
             <a:r>
-              <a:rPr lang="en-US" smtClean="0"/>
+              <a:rPr lang="en-US"/>
               <a:t>Second level</a:t>
             </a:r>
           </a:p>
           <a:p>
             <a:pPr lvl="2"/>
             <a:r>
-              <a:rPr lang="en-US" smtClean="0"/>
+              <a:rPr lang="en-US"/>
               <a:t>Third level</a:t>
             </a:r>
           </a:p>
           <a:p>
             <a:pPr lvl="3"/>
             <a:r>
-              <a:rPr lang="en-US" smtClean="0"/>
+              <a:rPr lang="en-US"/>
               <a:t>Fourth level</a:t>
             </a:r>
           </a:p>
           <a:p>
             <a:pPr lvl="4"/>
             <a:r>
-              <a:rPr lang="en-US" smtClean="0"/>
+              <a:rPr lang="en-US"/>
               <a:t>Fifth level</a:t>
             </a:r>
             <a:endParaRPr lang="nl-NL"/>
@@ -1257,7 +1272,7 @@
           <a:p>
             <a:fld id="{F1AB0A4F-6540-4743-9EF4-F756C9CDC2E2}" type="datetime1">
               <a:rPr lang="nl-NL" smtClean="0"/>
-              <a:t>27-5-2020</a:t>
+              <a:t>7-4-2022</a:t>
             </a:fld>
             <a:endParaRPr lang="nl-NL"/>
           </a:p>
@@ -1315,13 +1330,6 @@
   <p:clrMapOvr>
     <a:masterClrMapping/>
   </p:clrMapOvr>
-  <p:timing>
-    <p:tnLst>
-      <p:par>
-        <p:cTn id="1" dur="indefinite" restart="never" nodeType="tmRoot"/>
-      </p:par>
-    </p:tnLst>
-  </p:timing>
 </p:sldLayout>
 </file>
 
@@ -1358,7 +1366,7 @@
           <a:lstStyle/>
           <a:p>
             <a:r>
-              <a:rPr lang="en-US" smtClean="0"/>
+              <a:rPr lang="en-US"/>
               <a:t>Click to edit Master title style</a:t>
             </a:r>
             <a:endParaRPr lang="nl-NL"/>
@@ -1382,35 +1390,35 @@
           <a:p>
             <a:pPr lvl="0"/>
             <a:r>
-              <a:rPr lang="en-US" smtClean="0"/>
+              <a:rPr lang="en-US"/>
               <a:t>Click to edit Master text styles</a:t>
             </a:r>
           </a:p>
           <a:p>
             <a:pPr lvl="1"/>
             <a:r>
-              <a:rPr lang="en-US" smtClean="0"/>
+              <a:rPr lang="en-US"/>
               <a:t>Second level</a:t>
             </a:r>
           </a:p>
           <a:p>
             <a:pPr lvl="2"/>
             <a:r>
-              <a:rPr lang="en-US" smtClean="0"/>
+              <a:rPr lang="en-US"/>
               <a:t>Third level</a:t>
             </a:r>
           </a:p>
           <a:p>
             <a:pPr lvl="3"/>
             <a:r>
-              <a:rPr lang="en-US" smtClean="0"/>
+              <a:rPr lang="en-US"/>
               <a:t>Fourth level</a:t>
             </a:r>
           </a:p>
           <a:p>
             <a:pPr lvl="4"/>
             <a:r>
-              <a:rPr lang="en-US" smtClean="0"/>
+              <a:rPr lang="en-US"/>
               <a:t>Fifth level</a:t>
             </a:r>
             <a:endParaRPr lang="nl-NL"/>
@@ -1434,7 +1442,7 @@
           <a:p>
             <a:fld id="{D0045473-D831-41BC-9522-227E98D98464}" type="datetime1">
               <a:rPr lang="nl-NL" smtClean="0"/>
-              <a:t>27-5-2020</a:t>
+              <a:t>7-4-2022</a:t>
             </a:fld>
             <a:endParaRPr lang="nl-NL"/>
           </a:p>
@@ -1492,13 +1500,6 @@
   <p:clrMapOvr>
     <a:masterClrMapping/>
   </p:clrMapOvr>
-  <p:timing>
-    <p:tnLst>
-      <p:par>
-        <p:cTn id="1" dur="indefinite" restart="never" nodeType="tmRoot"/>
-      </p:par>
-    </p:tnLst>
-  </p:timing>
 </p:sldLayout>
 </file>
 
@@ -1544,7 +1545,7 @@
           </a:lstStyle>
           <a:p>
             <a:r>
-              <a:rPr lang="en-US" smtClean="0"/>
+              <a:rPr lang="en-US"/>
               <a:t>Click to edit Master title style</a:t>
             </a:r>
             <a:endParaRPr lang="nl-NL"/>
@@ -1664,7 +1665,7 @@
           <a:p>
             <a:pPr lvl="0"/>
             <a:r>
-              <a:rPr lang="en-US" smtClean="0"/>
+              <a:rPr lang="en-US"/>
               <a:t>Click to edit Master text styles</a:t>
             </a:r>
           </a:p>
@@ -1687,7 +1688,7 @@
           <a:p>
             <a:fld id="{6CAB0310-20CF-49FB-B1BF-8675AD6B9322}" type="datetime1">
               <a:rPr lang="nl-NL" smtClean="0"/>
-              <a:t>27-5-2020</a:t>
+              <a:t>7-4-2022</a:t>
             </a:fld>
             <a:endParaRPr lang="nl-NL"/>
           </a:p>
@@ -1781,7 +1782,7 @@
           <a:lstStyle/>
           <a:p>
             <a:r>
-              <a:rPr lang="en-US" smtClean="0"/>
+              <a:rPr lang="en-US"/>
               <a:t>Click to edit Master title style</a:t>
             </a:r>
             <a:endParaRPr lang="nl-NL"/>
@@ -1838,35 +1839,35 @@
           <a:p>
             <a:pPr lvl="0"/>
             <a:r>
-              <a:rPr lang="en-US" smtClean="0"/>
+              <a:rPr lang="en-US"/>
               <a:t>Click to edit Master text styles</a:t>
             </a:r>
           </a:p>
           <a:p>
             <a:pPr lvl="1"/>
             <a:r>
-              <a:rPr lang="en-US" smtClean="0"/>
+              <a:rPr lang="en-US"/>
               <a:t>Second level</a:t>
             </a:r>
           </a:p>
           <a:p>
             <a:pPr lvl="2"/>
             <a:r>
-              <a:rPr lang="en-US" smtClean="0"/>
+              <a:rPr lang="en-US"/>
               <a:t>Third level</a:t>
             </a:r>
           </a:p>
           <a:p>
             <a:pPr lvl="3"/>
             <a:r>
-              <a:rPr lang="en-US" smtClean="0"/>
+              <a:rPr lang="en-US"/>
               <a:t>Fourth level</a:t>
             </a:r>
           </a:p>
           <a:p>
             <a:pPr lvl="4"/>
             <a:r>
-              <a:rPr lang="en-US" smtClean="0"/>
+              <a:rPr lang="en-US"/>
               <a:t>Fifth level</a:t>
             </a:r>
             <a:endParaRPr lang="nl-NL"/>
@@ -1923,35 +1924,35 @@
           <a:p>
             <a:pPr lvl="0"/>
             <a:r>
-              <a:rPr lang="en-US" smtClean="0"/>
+              <a:rPr lang="en-US"/>
               <a:t>Click to edit Master text styles</a:t>
             </a:r>
           </a:p>
           <a:p>
             <a:pPr lvl="1"/>
             <a:r>
-              <a:rPr lang="en-US" smtClean="0"/>
+              <a:rPr lang="en-US"/>
               <a:t>Second level</a:t>
             </a:r>
           </a:p>
           <a:p>
             <a:pPr lvl="2"/>
             <a:r>
-              <a:rPr lang="en-US" smtClean="0"/>
+              <a:rPr lang="en-US"/>
               <a:t>Third level</a:t>
             </a:r>
           </a:p>
           <a:p>
             <a:pPr lvl="3"/>
             <a:r>
-              <a:rPr lang="en-US" smtClean="0"/>
+              <a:rPr lang="en-US"/>
               <a:t>Fourth level</a:t>
             </a:r>
           </a:p>
           <a:p>
             <a:pPr lvl="4"/>
             <a:r>
-              <a:rPr lang="en-US" smtClean="0"/>
+              <a:rPr lang="en-US"/>
               <a:t>Fifth level</a:t>
             </a:r>
             <a:endParaRPr lang="nl-NL"/>
@@ -1975,7 +1976,7 @@
           <a:p>
             <a:fld id="{6A569712-6DF7-4129-B7F8-4F88202F5313}" type="datetime1">
               <a:rPr lang="nl-NL" smtClean="0"/>
-              <a:t>27-5-2020</a:t>
+              <a:t>7-4-2022</a:t>
             </a:fld>
             <a:endParaRPr lang="nl-NL"/>
           </a:p>
@@ -2033,13 +2034,6 @@
   <p:clrMapOvr>
     <a:masterClrMapping/>
   </p:clrMapOvr>
-  <p:timing>
-    <p:tnLst>
-      <p:par>
-        <p:cTn id="1" dur="indefinite" restart="never" nodeType="tmRoot"/>
-      </p:par>
-    </p:tnLst>
-  </p:timing>
 </p:sldLayout>
 </file>
 
@@ -2080,7 +2074,7 @@
           </a:lstStyle>
           <a:p>
             <a:r>
-              <a:rPr lang="en-US" smtClean="0"/>
+              <a:rPr lang="en-US"/>
               <a:t>Click to edit Master title style</a:t>
             </a:r>
             <a:endParaRPr lang="nl-NL"/>
@@ -2146,7 +2140,7 @@
           <a:p>
             <a:pPr lvl="0"/>
             <a:r>
-              <a:rPr lang="en-US" smtClean="0"/>
+              <a:rPr lang="en-US"/>
               <a:t>Click to edit Master text styles</a:t>
             </a:r>
           </a:p>
@@ -2202,35 +2196,35 @@
           <a:p>
             <a:pPr lvl="0"/>
             <a:r>
-              <a:rPr lang="en-US" smtClean="0"/>
+              <a:rPr lang="en-US"/>
               <a:t>Click to edit Master text styles</a:t>
             </a:r>
           </a:p>
           <a:p>
             <a:pPr lvl="1"/>
             <a:r>
-              <a:rPr lang="en-US" smtClean="0"/>
+              <a:rPr lang="en-US"/>
               <a:t>Second level</a:t>
             </a:r>
           </a:p>
           <a:p>
             <a:pPr lvl="2"/>
             <a:r>
-              <a:rPr lang="en-US" smtClean="0"/>
+              <a:rPr lang="en-US"/>
               <a:t>Third level</a:t>
             </a:r>
           </a:p>
           <a:p>
             <a:pPr lvl="3"/>
             <a:r>
-              <a:rPr lang="en-US" smtClean="0"/>
+              <a:rPr lang="en-US"/>
               <a:t>Fourth level</a:t>
             </a:r>
           </a:p>
           <a:p>
             <a:pPr lvl="4"/>
             <a:r>
-              <a:rPr lang="en-US" smtClean="0"/>
+              <a:rPr lang="en-US"/>
               <a:t>Fifth level</a:t>
             </a:r>
             <a:endParaRPr lang="nl-NL"/>
@@ -2296,7 +2290,7 @@
           <a:p>
             <a:pPr lvl="0"/>
             <a:r>
-              <a:rPr lang="en-US" smtClean="0"/>
+              <a:rPr lang="en-US"/>
               <a:t>Click to edit Master text styles</a:t>
             </a:r>
           </a:p>
@@ -2352,35 +2346,35 @@
           <a:p>
             <a:pPr lvl="0"/>
             <a:r>
-              <a:rPr lang="en-US" smtClean="0"/>
+              <a:rPr lang="en-US"/>
               <a:t>Click to edit Master text styles</a:t>
             </a:r>
           </a:p>
           <a:p>
             <a:pPr lvl="1"/>
             <a:r>
-              <a:rPr lang="en-US" smtClean="0"/>
+              <a:rPr lang="en-US"/>
               <a:t>Second level</a:t>
             </a:r>
           </a:p>
           <a:p>
             <a:pPr lvl="2"/>
             <a:r>
-              <a:rPr lang="en-US" smtClean="0"/>
+              <a:rPr lang="en-US"/>
               <a:t>Third level</a:t>
             </a:r>
           </a:p>
           <a:p>
             <a:pPr lvl="3"/>
             <a:r>
-              <a:rPr lang="en-US" smtClean="0"/>
+              <a:rPr lang="en-US"/>
               <a:t>Fourth level</a:t>
             </a:r>
           </a:p>
           <a:p>
             <a:pPr lvl="4"/>
             <a:r>
-              <a:rPr lang="en-US" smtClean="0"/>
+              <a:rPr lang="en-US"/>
               <a:t>Fifth level</a:t>
             </a:r>
             <a:endParaRPr lang="nl-NL"/>
@@ -2404,7 +2398,7 @@
           <a:p>
             <a:fld id="{0C766890-73F5-48ED-9673-4F6D65817D05}" type="datetime1">
               <a:rPr lang="nl-NL" smtClean="0"/>
-              <a:t>27-5-2020</a:t>
+              <a:t>7-4-2022</a:t>
             </a:fld>
             <a:endParaRPr lang="nl-NL"/>
           </a:p>
@@ -2462,13 +2456,6 @@
   <p:clrMapOvr>
     <a:masterClrMapping/>
   </p:clrMapOvr>
-  <p:timing>
-    <p:tnLst>
-      <p:par>
-        <p:cTn id="1" dur="indefinite" restart="never" nodeType="tmRoot"/>
-      </p:par>
-    </p:tnLst>
-  </p:timing>
 </p:sldLayout>
 </file>
 
@@ -2505,7 +2492,7 @@
           <a:lstStyle/>
           <a:p>
             <a:r>
-              <a:rPr lang="en-US" smtClean="0"/>
+              <a:rPr lang="en-US"/>
               <a:t>Click to edit Master title style</a:t>
             </a:r>
             <a:endParaRPr lang="nl-NL"/>
@@ -2529,7 +2516,7 @@
           <a:p>
             <a:fld id="{DF6F115C-1185-4EE6-A6D1-A3F1E183779C}" type="datetime1">
               <a:rPr lang="nl-NL" smtClean="0"/>
-              <a:t>27-5-2020</a:t>
+              <a:t>7-4-2022</a:t>
             </a:fld>
             <a:endParaRPr lang="nl-NL"/>
           </a:p>
@@ -2587,13 +2574,6 @@
   <p:clrMapOvr>
     <a:masterClrMapping/>
   </p:clrMapOvr>
-  <p:timing>
-    <p:tnLst>
-      <p:par>
-        <p:cTn id="1" dur="indefinite" restart="never" nodeType="tmRoot"/>
-      </p:par>
-    </p:tnLst>
-  </p:timing>
 </p:sldLayout>
 </file>
 
@@ -2631,7 +2611,7 @@
           <a:p>
             <a:fld id="{8D1EF186-22E5-471A-91BD-D7F5BB6446F0}" type="datetime1">
               <a:rPr lang="nl-NL" smtClean="0"/>
-              <a:t>27-5-2020</a:t>
+              <a:t>7-4-2022</a:t>
             </a:fld>
             <a:endParaRPr lang="nl-NL"/>
           </a:p>
@@ -2689,13 +2669,6 @@
   <p:clrMapOvr>
     <a:masterClrMapping/>
   </p:clrMapOvr>
-  <p:timing>
-    <p:tnLst>
-      <p:par>
-        <p:cTn id="1" dur="indefinite" restart="never" nodeType="tmRoot"/>
-      </p:par>
-    </p:tnLst>
-  </p:timing>
 </p:sldLayout>
 </file>
 
@@ -2741,7 +2714,7 @@
           </a:lstStyle>
           <a:p>
             <a:r>
-              <a:rPr lang="en-US" smtClean="0"/>
+              <a:rPr lang="en-US"/>
               <a:t>Click to edit Master title style</a:t>
             </a:r>
             <a:endParaRPr lang="nl-NL"/>
@@ -2798,35 +2771,35 @@
           <a:p>
             <a:pPr lvl="0"/>
             <a:r>
-              <a:rPr lang="en-US" smtClean="0"/>
+              <a:rPr lang="en-US"/>
               <a:t>Click to edit Master text styles</a:t>
             </a:r>
           </a:p>
           <a:p>
             <a:pPr lvl="1"/>
             <a:r>
-              <a:rPr lang="en-US" smtClean="0"/>
+              <a:rPr lang="en-US"/>
               <a:t>Second level</a:t>
             </a:r>
           </a:p>
           <a:p>
             <a:pPr lvl="2"/>
             <a:r>
-              <a:rPr lang="en-US" smtClean="0"/>
+              <a:rPr lang="en-US"/>
               <a:t>Third level</a:t>
             </a:r>
           </a:p>
           <a:p>
             <a:pPr lvl="3"/>
             <a:r>
-              <a:rPr lang="en-US" smtClean="0"/>
+              <a:rPr lang="en-US"/>
               <a:t>Fourth level</a:t>
             </a:r>
           </a:p>
           <a:p>
             <a:pPr lvl="4"/>
             <a:r>
-              <a:rPr lang="en-US" smtClean="0"/>
+              <a:rPr lang="en-US"/>
               <a:t>Fifth level</a:t>
             </a:r>
             <a:endParaRPr lang="nl-NL"/>
@@ -2892,7 +2865,7 @@
           <a:p>
             <a:pPr lvl="0"/>
             <a:r>
-              <a:rPr lang="en-US" smtClean="0"/>
+              <a:rPr lang="en-US"/>
               <a:t>Click to edit Master text styles</a:t>
             </a:r>
           </a:p>
@@ -2915,7 +2888,7 @@
           <a:p>
             <a:fld id="{2DEC052C-DB5E-4407-AC90-BA361F2F2D7F}" type="datetime1">
               <a:rPr lang="nl-NL" smtClean="0"/>
-              <a:t>27-5-2020</a:t>
+              <a:t>7-4-2022</a:t>
             </a:fld>
             <a:endParaRPr lang="nl-NL"/>
           </a:p>
@@ -2973,13 +2946,6 @@
   <p:clrMapOvr>
     <a:masterClrMapping/>
   </p:clrMapOvr>
-  <p:timing>
-    <p:tnLst>
-      <p:par>
-        <p:cTn id="1" dur="indefinite" restart="never" nodeType="tmRoot"/>
-      </p:par>
-    </p:tnLst>
-  </p:timing>
 </p:sldLayout>
 </file>
 
@@ -3025,7 +2991,7 @@
           </a:lstStyle>
           <a:p>
             <a:r>
-              <a:rPr lang="en-US" smtClean="0"/>
+              <a:rPr lang="en-US"/>
               <a:t>Click to edit Master title style</a:t>
             </a:r>
             <a:endParaRPr lang="nl-NL"/>
@@ -3152,7 +3118,7 @@
           <a:p>
             <a:pPr lvl="0"/>
             <a:r>
-              <a:rPr lang="en-US" smtClean="0"/>
+              <a:rPr lang="en-US"/>
               <a:t>Click to edit Master text styles</a:t>
             </a:r>
           </a:p>
@@ -3175,7 +3141,7 @@
           <a:p>
             <a:fld id="{19C424AE-177A-44BE-AD27-DC1646970992}" type="datetime1">
               <a:rPr lang="nl-NL" smtClean="0"/>
-              <a:t>27-5-2020</a:t>
+              <a:t>7-4-2022</a:t>
             </a:fld>
             <a:endParaRPr lang="nl-NL"/>
           </a:p>
@@ -3233,13 +3199,6 @@
   <p:clrMapOvr>
     <a:masterClrMapping/>
   </p:clrMapOvr>
-  <p:timing>
-    <p:tnLst>
-      <p:par>
-        <p:cTn id="1" dur="indefinite" restart="never" nodeType="tmRoot"/>
-      </p:par>
-    </p:tnLst>
-  </p:timing>
 </p:sldLayout>
 </file>
 
@@ -3291,7 +3250,7 @@
           <a:lstStyle/>
           <a:p>
             <a:r>
-              <a:rPr lang="en-US" smtClean="0"/>
+              <a:rPr lang="en-US"/>
               <a:t>Click to edit Master title style</a:t>
             </a:r>
             <a:endParaRPr lang="nl-NL"/>
@@ -3325,35 +3284,35 @@
           <a:p>
             <a:pPr lvl="0"/>
             <a:r>
-              <a:rPr lang="en-US" smtClean="0"/>
+              <a:rPr lang="en-US"/>
               <a:t>Click to edit Master text styles</a:t>
             </a:r>
           </a:p>
           <a:p>
             <a:pPr lvl="1"/>
             <a:r>
-              <a:rPr lang="en-US" smtClean="0"/>
+              <a:rPr lang="en-US"/>
               <a:t>Second level</a:t>
             </a:r>
           </a:p>
           <a:p>
             <a:pPr lvl="2"/>
             <a:r>
-              <a:rPr lang="en-US" smtClean="0"/>
+              <a:rPr lang="en-US"/>
               <a:t>Third level</a:t>
             </a:r>
           </a:p>
           <a:p>
             <a:pPr lvl="3"/>
             <a:r>
-              <a:rPr lang="en-US" smtClean="0"/>
+              <a:rPr lang="en-US"/>
               <a:t>Fourth level</a:t>
             </a:r>
           </a:p>
           <a:p>
             <a:pPr lvl="4"/>
             <a:r>
-              <a:rPr lang="en-US" smtClean="0"/>
+              <a:rPr lang="en-US"/>
               <a:t>Fifth level</a:t>
             </a:r>
             <a:endParaRPr lang="nl-NL"/>
@@ -3395,7 +3354,7 @@
           <a:p>
             <a:fld id="{8D1EF186-22E5-471A-91BD-D7F5BB6446F0}" type="datetime1">
               <a:rPr lang="nl-NL" smtClean="0"/>
-              <a:t>27-5-2020</a:t>
+              <a:t>7-4-2022</a:t>
             </a:fld>
             <a:endParaRPr lang="nl-NL"/>
           </a:p>
@@ -3500,13 +3459,6 @@
     <p:sldLayoutId id="2147483658" r:id="rId10"/>
     <p:sldLayoutId id="2147483659" r:id="rId11"/>
   </p:sldLayoutIdLst>
-  <p:timing>
-    <p:tnLst>
-      <p:par>
-        <p:cTn id="1" dur="indefinite" restart="never" nodeType="tmRoot"/>
-      </p:par>
-    </p:tnLst>
-  </p:timing>
   <p:hf hdr="0" ftr="0" dt="0"/>
   <p:txStyles>
     <p:titleStyle>
@@ -3800,7 +3752,7 @@
         </p:blipFill>
         <p:spPr>
           <a:xfrm rot="2290774" flipH="1">
-            <a:off x="3011341" y="5280991"/>
+            <a:off x="3118603" y="3309910"/>
             <a:ext cx="966614" cy="1073016"/>
           </a:xfrm>
           <a:prstGeom prst="rect">
@@ -3829,7 +3781,7 @@
         </p:blipFill>
         <p:spPr bwMode="auto">
           <a:xfrm>
-            <a:off x="2515112" y="6596647"/>
+            <a:off x="2622374" y="4625566"/>
             <a:ext cx="3776354" cy="2836535"/>
           </a:xfrm>
           <a:prstGeom prst="rect">
@@ -3881,7 +3833,7 @@
         </p:blipFill>
         <p:spPr bwMode="auto">
           <a:xfrm>
-            <a:off x="563226" y="8204159"/>
+            <a:off x="670488" y="6233078"/>
             <a:ext cx="1443905" cy="1177841"/>
           </a:xfrm>
           <a:prstGeom prst="rect">
@@ -3920,7 +3872,7 @@
         </p:nvSpPr>
         <p:spPr>
           <a:xfrm flipH="1">
-            <a:off x="1392996" y="5683879"/>
+            <a:off x="1454169" y="3772269"/>
             <a:ext cx="3086874" cy="5040560"/>
           </a:xfrm>
           <a:prstGeom prst="arc">
@@ -3964,15 +3916,15 @@
         </p:nvSpPr>
         <p:spPr>
           <a:xfrm>
-            <a:off x="0" y="0"/>
-            <a:ext cx="260648" cy="9906000"/>
+            <a:off x="0" y="-7444"/>
+            <a:ext cx="188640" cy="9906000"/>
           </a:xfrm>
           <a:prstGeom prst="rect">
             <a:avLst/>
           </a:prstGeom>
           <a:solidFill>
-            <a:schemeClr val="bg2">
-              <a:lumMod val="90000"/>
+            <a:schemeClr val="accent1">
+              <a:lumMod val="75000"/>
             </a:schemeClr>
           </a:solidFill>
           <a:ln>
@@ -4012,15 +3964,15 @@
         </p:nvSpPr>
         <p:spPr>
           <a:xfrm>
-            <a:off x="6600092" y="141639"/>
-            <a:ext cx="257908" cy="9764361"/>
+            <a:off x="6677941" y="141639"/>
+            <a:ext cx="188641" cy="9764361"/>
           </a:xfrm>
           <a:prstGeom prst="rect">
             <a:avLst/>
           </a:prstGeom>
           <a:solidFill>
-            <a:schemeClr val="bg2">
-              <a:lumMod val="90000"/>
+            <a:schemeClr val="accent1">
+              <a:lumMod val="75000"/>
             </a:schemeClr>
           </a:solidFill>
           <a:ln>
@@ -4060,15 +4012,15 @@
         </p:nvSpPr>
         <p:spPr>
           <a:xfrm>
-            <a:off x="0" y="9633520"/>
-            <a:ext cx="6858000" cy="272480"/>
+            <a:off x="-2712" y="9756514"/>
+            <a:ext cx="6867783" cy="162092"/>
           </a:xfrm>
           <a:prstGeom prst="rect">
             <a:avLst/>
           </a:prstGeom>
           <a:solidFill>
-            <a:schemeClr val="bg2">
-              <a:lumMod val="90000"/>
+            <a:schemeClr val="accent1">
+              <a:lumMod val="75000"/>
             </a:schemeClr>
           </a:solidFill>
           <a:ln>
@@ -4108,15 +4060,15 @@
         </p:nvSpPr>
         <p:spPr>
           <a:xfrm>
-            <a:off x="-1449" y="-39555"/>
-            <a:ext cx="6867783" cy="312035"/>
+            <a:off x="-1449" y="-39554"/>
+            <a:ext cx="6867783" cy="215460"/>
           </a:xfrm>
           <a:prstGeom prst="rect">
             <a:avLst/>
           </a:prstGeom>
           <a:solidFill>
-            <a:schemeClr val="bg2">
-              <a:lumMod val="90000"/>
+            <a:schemeClr val="accent1">
+              <a:lumMod val="75000"/>
             </a:schemeClr>
           </a:solidFill>
           <a:ln>
@@ -4162,12 +4114,17 @@
         </p:nvSpPr>
         <p:spPr>
           <a:xfrm>
-            <a:off x="1402935" y="3512840"/>
-            <a:ext cx="4412268" cy="720080"/>
+            <a:off x="909442" y="2213048"/>
+            <a:ext cx="4176328" cy="720080"/>
           </a:xfrm>
           <a:prstGeom prst="rect">
             <a:avLst/>
           </a:prstGeom>
+          <a:solidFill>
+            <a:schemeClr val="accent1">
+              <a:lumMod val="75000"/>
+            </a:schemeClr>
+          </a:solidFill>
         </p:spPr>
         <p:txBody>
           <a:bodyPr/>
@@ -4309,86 +4266,18 @@
             </a:lvl9pPr>
           </a:lstStyle>
           <a:p>
-            <a:pPr marL="0" indent="0" algn="ctr">
+            <a:pPr marL="0" indent="0">
               <a:buNone/>
             </a:pPr>
             <a:r>
-              <a:rPr lang="en-US" dirty="0" smtClean="0">
+              <a:rPr lang="en-US" sz="3600" b="1" dirty="0">
                 <a:solidFill>
-                  <a:schemeClr val="bg1">
-                    <a:lumMod val="65000"/>
-                  </a:schemeClr>
+                  <a:schemeClr val="bg1"/>
                 </a:solidFill>
+                <a:latin typeface="Arial Nova" panose="020B0504020202020204" pitchFamily="34" charset="0"/>
               </a:rPr>
-              <a:t>App Builder’s </a:t>
-            </a:r>
-            <a:r>
-              <a:rPr lang="en-US" dirty="0" smtClean="0">
-                <a:solidFill>
-                  <a:schemeClr val="bg1">
-                    <a:lumMod val="65000"/>
-                  </a:schemeClr>
-                </a:solidFill>
-              </a:rPr>
-              <a:t>Guide</a:t>
-            </a:r>
-            <a:endParaRPr lang="en-US" dirty="0" smtClean="0">
-              <a:solidFill>
-                <a:schemeClr val="bg1">
-                  <a:lumMod val="65000"/>
-                </a:schemeClr>
-              </a:solidFill>
-            </a:endParaRPr>
-          </a:p>
-        </p:txBody>
-      </p:sp>
-      <p:sp>
-        <p:nvSpPr>
-          <p:cNvPr id="37" name="Rectangle 36"/>
-          <p:cNvSpPr/>
-          <p:nvPr/>
-        </p:nvSpPr>
-        <p:spPr>
-          <a:xfrm>
-            <a:off x="44624" y="24883"/>
-            <a:ext cx="6768752" cy="9833992"/>
-          </a:xfrm>
-          <a:prstGeom prst="rect">
-            <a:avLst/>
-          </a:prstGeom>
-          <a:noFill/>
-          <a:ln w="76200">
-            <a:solidFill>
-              <a:srgbClr val="FF0000"/>
-            </a:solidFill>
-          </a:ln>
-        </p:spPr>
-        <p:style>
-          <a:lnRef idx="2">
-            <a:schemeClr val="accent1">
-              <a:shade val="50000"/>
-            </a:schemeClr>
-          </a:lnRef>
-          <a:fillRef idx="1">
-            <a:schemeClr val="accent1"/>
-          </a:fillRef>
-          <a:effectRef idx="0">
-            <a:schemeClr val="accent1"/>
-          </a:effectRef>
-          <a:fontRef idx="minor">
-            <a:schemeClr val="lt1"/>
-          </a:fontRef>
-        </p:style>
-        <p:txBody>
-          <a:bodyPr rtlCol="0" anchor="ctr"/>
-          <a:lstStyle/>
-          <a:p>
-            <a:pPr algn="ctr"/>
-            <a:endParaRPr lang="en-US">
-              <a:solidFill>
-                <a:srgbClr val="FF0000"/>
-              </a:solidFill>
-            </a:endParaRPr>
+              <a:t>Developer’s Guide</a:t>
+            </a:r>
           </a:p>
         </p:txBody>
       </p:sp>
@@ -4400,7 +4289,7 @@
           </p:cNvPicPr>
           <p:nvPr/>
         </p:nvPicPr>
-        <p:blipFill>
+        <p:blipFill rotWithShape="1">
           <a:blip r:embed="rId6">
             <a:extLst>
               <a:ext uri="{28A0092B-C50C-407E-A947-70E740481C1C}">
@@ -4408,20 +4297,217 @@
               </a:ext>
             </a:extLst>
           </a:blip>
-          <a:stretch>
-            <a:fillRect/>
-          </a:stretch>
+          <a:srcRect b="22727"/>
+          <a:stretch/>
         </p:blipFill>
         <p:spPr>
           <a:xfrm>
-            <a:off x="1305912" y="1208584"/>
-            <a:ext cx="4510108" cy="1584176"/>
+            <a:off x="622309" y="736635"/>
+            <a:ext cx="4510108" cy="1224136"/>
           </a:xfrm>
           <a:prstGeom prst="rect">
             <a:avLst/>
           </a:prstGeom>
         </p:spPr>
       </p:pic>
+      <p:sp>
+        <p:nvSpPr>
+          <p:cNvPr id="13" name="Subtitle 3">
+            <a:extLst>
+              <a:ext uri="{FF2B5EF4-FFF2-40B4-BE49-F238E27FC236}">
+                <a16:creationId xmlns:a16="http://schemas.microsoft.com/office/drawing/2014/main" id="{C97392C5-581D-4525-829D-A53C520E4067}"/>
+              </a:ext>
+            </a:extLst>
+          </p:cNvPr>
+          <p:cNvSpPr txBox="1">
+            <a:spLocks/>
+          </p:cNvSpPr>
+          <p:nvPr/>
+        </p:nvSpPr>
+        <p:spPr>
+          <a:xfrm>
+            <a:off x="875719" y="8508978"/>
+            <a:ext cx="5112431" cy="775693"/>
+          </a:xfrm>
+          <a:prstGeom prst="rect">
+            <a:avLst/>
+          </a:prstGeom>
+          <a:solidFill>
+            <a:schemeClr val="accent1">
+              <a:lumMod val="75000"/>
+            </a:schemeClr>
+          </a:solidFill>
+        </p:spPr>
+        <p:txBody>
+          <a:bodyPr/>
+          <a:lstStyle>
+            <a:lvl1pPr marL="342900" indent="-342900" algn="l" defTabSz="914400" rtl="0" eaLnBrk="1" latinLnBrk="0" hangingPunct="1">
+              <a:spcBef>
+                <a:spcPct val="20000"/>
+              </a:spcBef>
+              <a:buFont typeface="Arial" panose="020B0604020202020204" pitchFamily="34" charset="0"/>
+              <a:buChar char="•"/>
+              <a:defRPr sz="3200" kern="1200">
+                <a:solidFill>
+                  <a:schemeClr val="tx1"/>
+                </a:solidFill>
+                <a:latin typeface="+mn-lt"/>
+                <a:ea typeface="+mn-ea"/>
+                <a:cs typeface="+mn-cs"/>
+              </a:defRPr>
+            </a:lvl1pPr>
+            <a:lvl2pPr marL="742950" indent="-285750" algn="l" defTabSz="914400" rtl="0" eaLnBrk="1" latinLnBrk="0" hangingPunct="1">
+              <a:spcBef>
+                <a:spcPct val="20000"/>
+              </a:spcBef>
+              <a:buFont typeface="Arial" panose="020B0604020202020204" pitchFamily="34" charset="0"/>
+              <a:buChar char="–"/>
+              <a:defRPr sz="2800" kern="1200">
+                <a:solidFill>
+                  <a:schemeClr val="tx1"/>
+                </a:solidFill>
+                <a:latin typeface="+mn-lt"/>
+                <a:ea typeface="+mn-ea"/>
+                <a:cs typeface="+mn-cs"/>
+              </a:defRPr>
+            </a:lvl2pPr>
+            <a:lvl3pPr marL="1143000" indent="-228600" algn="l" defTabSz="914400" rtl="0" eaLnBrk="1" latinLnBrk="0" hangingPunct="1">
+              <a:spcBef>
+                <a:spcPct val="20000"/>
+              </a:spcBef>
+              <a:buFont typeface="Arial" panose="020B0604020202020204" pitchFamily="34" charset="0"/>
+              <a:buChar char="•"/>
+              <a:defRPr sz="2400" kern="1200">
+                <a:solidFill>
+                  <a:schemeClr val="tx1"/>
+                </a:solidFill>
+                <a:latin typeface="+mn-lt"/>
+                <a:ea typeface="+mn-ea"/>
+                <a:cs typeface="+mn-cs"/>
+              </a:defRPr>
+            </a:lvl3pPr>
+            <a:lvl4pPr marL="1600200" indent="-228600" algn="l" defTabSz="914400" rtl="0" eaLnBrk="1" latinLnBrk="0" hangingPunct="1">
+              <a:spcBef>
+                <a:spcPct val="20000"/>
+              </a:spcBef>
+              <a:buFont typeface="Arial" panose="020B0604020202020204" pitchFamily="34" charset="0"/>
+              <a:buChar char="–"/>
+              <a:defRPr sz="2000" kern="1200">
+                <a:solidFill>
+                  <a:schemeClr val="tx1"/>
+                </a:solidFill>
+                <a:latin typeface="+mn-lt"/>
+                <a:ea typeface="+mn-ea"/>
+                <a:cs typeface="+mn-cs"/>
+              </a:defRPr>
+            </a:lvl4pPr>
+            <a:lvl5pPr marL="2057400" indent="-228600" algn="l" defTabSz="914400" rtl="0" eaLnBrk="1" latinLnBrk="0" hangingPunct="1">
+              <a:spcBef>
+                <a:spcPct val="20000"/>
+              </a:spcBef>
+              <a:buFont typeface="Arial" panose="020B0604020202020204" pitchFamily="34" charset="0"/>
+              <a:buChar char="»"/>
+              <a:defRPr sz="2000" kern="1200">
+                <a:solidFill>
+                  <a:schemeClr val="tx1"/>
+                </a:solidFill>
+                <a:latin typeface="+mn-lt"/>
+                <a:ea typeface="+mn-ea"/>
+                <a:cs typeface="+mn-cs"/>
+              </a:defRPr>
+            </a:lvl5pPr>
+            <a:lvl6pPr marL="2514600" indent="-228600" algn="l" defTabSz="914400" rtl="0" eaLnBrk="1" latinLnBrk="0" hangingPunct="1">
+              <a:spcBef>
+                <a:spcPct val="20000"/>
+              </a:spcBef>
+              <a:buFont typeface="Arial" panose="020B0604020202020204" pitchFamily="34" charset="0"/>
+              <a:buChar char="•"/>
+              <a:defRPr sz="2000" kern="1200">
+                <a:solidFill>
+                  <a:schemeClr val="tx1"/>
+                </a:solidFill>
+                <a:latin typeface="+mn-lt"/>
+                <a:ea typeface="+mn-ea"/>
+                <a:cs typeface="+mn-cs"/>
+              </a:defRPr>
+            </a:lvl6pPr>
+            <a:lvl7pPr marL="2971800" indent="-228600" algn="l" defTabSz="914400" rtl="0" eaLnBrk="1" latinLnBrk="0" hangingPunct="1">
+              <a:spcBef>
+                <a:spcPct val="20000"/>
+              </a:spcBef>
+              <a:buFont typeface="Arial" panose="020B0604020202020204" pitchFamily="34" charset="0"/>
+              <a:buChar char="•"/>
+              <a:defRPr sz="2000" kern="1200">
+                <a:solidFill>
+                  <a:schemeClr val="tx1"/>
+                </a:solidFill>
+                <a:latin typeface="+mn-lt"/>
+                <a:ea typeface="+mn-ea"/>
+                <a:cs typeface="+mn-cs"/>
+              </a:defRPr>
+            </a:lvl7pPr>
+            <a:lvl8pPr marL="3429000" indent="-228600" algn="l" defTabSz="914400" rtl="0" eaLnBrk="1" latinLnBrk="0" hangingPunct="1">
+              <a:spcBef>
+                <a:spcPct val="20000"/>
+              </a:spcBef>
+              <a:buFont typeface="Arial" panose="020B0604020202020204" pitchFamily="34" charset="0"/>
+              <a:buChar char="•"/>
+              <a:defRPr sz="2000" kern="1200">
+                <a:solidFill>
+                  <a:schemeClr val="tx1"/>
+                </a:solidFill>
+                <a:latin typeface="+mn-lt"/>
+                <a:ea typeface="+mn-ea"/>
+                <a:cs typeface="+mn-cs"/>
+              </a:defRPr>
+            </a:lvl8pPr>
+            <a:lvl9pPr marL="3886200" indent="-228600" algn="l" defTabSz="914400" rtl="0" eaLnBrk="1" latinLnBrk="0" hangingPunct="1">
+              <a:spcBef>
+                <a:spcPct val="20000"/>
+              </a:spcBef>
+              <a:buFont typeface="Arial" panose="020B0604020202020204" pitchFamily="34" charset="0"/>
+              <a:buChar char="•"/>
+              <a:defRPr sz="2000" kern="1200">
+                <a:solidFill>
+                  <a:schemeClr val="tx1"/>
+                </a:solidFill>
+                <a:latin typeface="+mn-lt"/>
+                <a:ea typeface="+mn-ea"/>
+                <a:cs typeface="+mn-cs"/>
+              </a:defRPr>
+            </a:lvl9pPr>
+          </a:lstStyle>
+          <a:p>
+            <a:pPr marL="0" indent="0">
+              <a:buNone/>
+            </a:pPr>
+            <a:r>
+              <a:rPr lang="en-US" sz="2000" b="1" dirty="0">
+                <a:solidFill>
+                  <a:schemeClr val="bg1"/>
+                </a:solidFill>
+                <a:latin typeface="Arial Nova" panose="020B0504020202020204" pitchFamily="34" charset="0"/>
+              </a:rPr>
+              <a:t>How to develop and deploy data analysis workflow components in </a:t>
+            </a:r>
+            <a:r>
+              <a:rPr lang="en-US" sz="2000" b="1" dirty="0" err="1">
+                <a:solidFill>
+                  <a:schemeClr val="bg1"/>
+                </a:solidFill>
+                <a:latin typeface="Arial Nova" panose="020B0504020202020204" pitchFamily="34" charset="0"/>
+              </a:rPr>
+              <a:t>Tercen</a:t>
+            </a:r>
+            <a:endParaRPr lang="en-US" sz="2000" b="1" dirty="0">
+              <a:solidFill>
+                <a:schemeClr val="bg1"/>
+              </a:solidFill>
+              <a:latin typeface="Arial Nova" panose="020B0504020202020204" pitchFamily="34" charset="0"/>
+            </a:endParaRPr>
+          </a:p>
+        </p:txBody>
+      </p:sp>
     </p:spTree>
     <p:extLst>
       <p:ext uri="{BB962C8B-B14F-4D97-AF65-F5344CB8AC3E}">
@@ -4432,13 +4518,6 @@
   <p:clrMapOvr>
     <a:masterClrMapping/>
   </p:clrMapOvr>
-  <p:timing>
-    <p:tnLst>
-      <p:par>
-        <p:cTn id="1" dur="indefinite" restart="never" nodeType="tmRoot"/>
-      </p:par>
-    </p:tnLst>
-  </p:timing>
 </p:sld>
 </file>
 

</xml_diff>